<commit_message>
change course for multithreading and nio
</commit_message>
<xml_diff>
--- a/io/presentation.pptx
+++ b/io/presentation.pptx
@@ -17,7 +17,16 @@
     <p:sldId id="266" r:id="rId11"/>
     <p:sldId id="267" r:id="rId12"/>
     <p:sldId id="268" r:id="rId13"/>
-    <p:sldId id="269" r:id="rId14"/>
+    <p:sldId id="279" r:id="rId14"/>
+    <p:sldId id="270" r:id="rId15"/>
+    <p:sldId id="271" r:id="rId16"/>
+    <p:sldId id="273" r:id="rId17"/>
+    <p:sldId id="274" r:id="rId18"/>
+    <p:sldId id="275" r:id="rId19"/>
+    <p:sldId id="276" r:id="rId20"/>
+    <p:sldId id="277" r:id="rId21"/>
+    <p:sldId id="278" r:id="rId22"/>
+    <p:sldId id="269" r:id="rId23"/>
   </p:sldIdLst>
   <p:sldSz cx="12192000" cy="6858000"/>
   <p:notesSz cx="6858000" cy="9144000"/>
@@ -116,6 +125,11 @@
       </a:defRPr>
     </a:lvl9pPr>
   </p:defaultTextStyle>
+  <p:extLst>
+    <p:ext uri="{EFAFB233-063F-42B5-8137-9DF3F51BA10A}">
+      <p15:sldGuideLst xmlns:p15="http://schemas.microsoft.com/office/powerpoint/2012/main"/>
+    </p:ext>
+  </p:extLst>
 </p:presentation>
 </file>
 
@@ -393,7 +407,7 @@
           <a:p>
             <a:fld id="{78ABE3C1-DBE1-495D-B57B-2849774B866A}" type="datetimeFigureOut">
               <a:rPr lang="en-US" dirty="0"/>
-              <a:t>4/24/23</a:t>
+              <a:t>5/23/23</a:t>
             </a:fld>
             <a:endParaRPr lang="en-US" dirty="0"/>
           </a:p>
@@ -802,7 +816,7 @@
           <a:p>
             <a:fld id="{446C117F-5CCF-4837-BE5F-2B92066CAFAF}" type="datetimeFigureOut">
               <a:rPr lang="en-US" dirty="0"/>
-              <a:t>4/24/23</a:t>
+              <a:t>5/23/23</a:t>
             </a:fld>
             <a:endParaRPr lang="en-US" dirty="0"/>
           </a:p>
@@ -1133,7 +1147,7 @@
           <a:p>
             <a:fld id="{84EB90BD-B6CE-46B7-997F-7313B992CCDC}" type="datetimeFigureOut">
               <a:rPr lang="en-US" dirty="0"/>
-              <a:t>4/24/23</a:t>
+              <a:t>5/23/23</a:t>
             </a:fld>
             <a:endParaRPr lang="en-US" dirty="0"/>
           </a:p>
@@ -1533,7 +1547,7 @@
           <a:p>
             <a:fld id="{CDB9D11F-B188-461D-B23F-39381795C052}" type="datetimeFigureOut">
               <a:rPr lang="en-US" dirty="0"/>
-              <a:t>4/24/23</a:t>
+              <a:t>5/23/23</a:t>
             </a:fld>
             <a:endParaRPr lang="en-US" dirty="0"/>
           </a:p>
@@ -2096,7 +2110,7 @@
           <a:p>
             <a:fld id="{52E6D8D9-55A2-4063-B0F3-121F44549695}" type="datetimeFigureOut">
               <a:rPr lang="en-US" dirty="0"/>
-              <a:t>4/24/23</a:t>
+              <a:t>5/23/23</a:t>
             </a:fld>
             <a:endParaRPr lang="en-US" dirty="0"/>
           </a:p>
@@ -2772,7 +2786,7 @@
           <a:p>
             <a:fld id="{D4B24536-994D-4021-A283-9F449C0DB509}" type="datetimeFigureOut">
               <a:rPr lang="en-US" dirty="0"/>
-              <a:t>4/24/23</a:t>
+              <a:t>5/23/23</a:t>
             </a:fld>
             <a:endParaRPr lang="en-US" dirty="0"/>
           </a:p>
@@ -3680,7 +3694,7 @@
           <a:p>
             <a:fld id="{3CBBBB78-C96F-47B7-AB17-D852CA960AC9}" type="datetimeFigureOut">
               <a:rPr lang="en-US" dirty="0"/>
-              <a:t>4/24/23</a:t>
+              <a:t>5/23/23</a:t>
             </a:fld>
             <a:endParaRPr lang="en-US" dirty="0"/>
           </a:p>
@@ -3988,7 +4002,7 @@
           <a:p>
             <a:fld id="{1FA3F48C-C7C6-4055-9F49-3777875E72AE}" type="datetimeFigureOut">
               <a:rPr lang="en-US" dirty="0"/>
-              <a:t>4/24/23</a:t>
+              <a:t>5/23/23</a:t>
             </a:fld>
             <a:endParaRPr lang="en-US" dirty="0"/>
           </a:p>
@@ -4247,7 +4261,7 @@
           <a:p>
             <a:fld id="{6178E61D-D431-422C-9764-11DAFE33AB63}" type="datetimeFigureOut">
               <a:rPr lang="en-US" dirty="0"/>
-              <a:t>4/24/23</a:t>
+              <a:t>5/23/23</a:t>
             </a:fld>
             <a:endParaRPr lang="en-US" dirty="0"/>
           </a:p>
@@ -4566,7 +4580,7 @@
           <a:p>
             <a:fld id="{12DE42F4-6EEF-4EF7-8ED4-2208F0F89A08}" type="datetimeFigureOut">
               <a:rPr lang="en-US" dirty="0"/>
-              <a:t>4/24/23</a:t>
+              <a:t>5/23/23</a:t>
             </a:fld>
             <a:endParaRPr lang="en-US" dirty="0"/>
           </a:p>
@@ -4950,7 +4964,7 @@
           <a:p>
             <a:fld id="{30578ACC-22D6-47C1-A373-4FD133E34F3C}" type="datetimeFigureOut">
               <a:rPr lang="en-US" dirty="0"/>
-              <a:t>4/24/23</a:t>
+              <a:t>5/23/23</a:t>
             </a:fld>
             <a:endParaRPr lang="en-US" dirty="0"/>
           </a:p>
@@ -5321,7 +5335,7 @@
           <a:p>
             <a:fld id="{4E5A6C69-6797-4E8A-BF37-F2C3751466E9}" type="datetimeFigureOut">
               <a:rPr lang="en-US" dirty="0"/>
-              <a:t>4/24/23</a:t>
+              <a:t>5/23/23</a:t>
             </a:fld>
             <a:endParaRPr lang="en-US" dirty="0"/>
           </a:p>
@@ -5822,7 +5836,7 @@
           <a:p>
             <a:fld id="{D82014A1-A632-4878-A0D3-F52BA7563730}" type="datetimeFigureOut">
               <a:rPr lang="en-US" dirty="0"/>
-              <a:t>4/24/23</a:t>
+              <a:t>5/23/23</a:t>
             </a:fld>
             <a:endParaRPr lang="en-US" dirty="0"/>
           </a:p>
@@ -6074,7 +6088,7 @@
           <a:p>
             <a:fld id="{CE99F462-093F-4566-844B-4C71F2739DA5}" type="datetimeFigureOut">
               <a:rPr lang="en-US" dirty="0"/>
-              <a:t>4/24/23</a:t>
+              <a:t>5/23/23</a:t>
             </a:fld>
             <a:endParaRPr lang="en-US" dirty="0"/>
           </a:p>
@@ -6232,7 +6246,7 @@
           <a:p>
             <a:fld id="{3D24A7AC-904D-4781-85BA-7D10C17ED021}" type="datetimeFigureOut">
               <a:rPr lang="en-US" dirty="0"/>
-              <a:t>4/24/23</a:t>
+              <a:t>5/23/23</a:t>
             </a:fld>
             <a:endParaRPr lang="en-US" dirty="0"/>
           </a:p>
@@ -6617,7 +6631,7 @@
           <a:p>
             <a:fld id="{E331444B-B92B-4E27-8C94-BB93EAF5CB18}" type="datetimeFigureOut">
               <a:rPr lang="en-US" dirty="0"/>
-              <a:t>4/24/23</a:t>
+              <a:t>5/23/23</a:t>
             </a:fld>
             <a:endParaRPr lang="en-US" dirty="0"/>
           </a:p>
@@ -7021,7 +7035,7 @@
           <a:p>
             <a:fld id="{363EFA5E-FA76-400D-B3DC-F0BA90E6D107}" type="datetimeFigureOut">
               <a:rPr lang="en-US" dirty="0"/>
-              <a:t>4/24/23</a:t>
+              <a:t>5/23/23</a:t>
             </a:fld>
             <a:endParaRPr lang="en-US" dirty="0"/>
           </a:p>
@@ -7260,7 +7274,7 @@
           <a:p>
             <a:fld id="{9D6E9DEC-419B-4CC5-A080-3B06BD5A8291}" type="datetimeFigureOut">
               <a:rPr lang="en-US" dirty="0"/>
-              <a:t>4/24/23</a:t>
+              <a:t>5/23/23</a:t>
             </a:fld>
             <a:endParaRPr lang="en-US" dirty="0"/>
           </a:p>
@@ -7690,10 +7704,10 @@
           <a:lstStyle/>
           <a:p>
             <a:r>
-              <a:rPr lang="en-US" b="1" i="1" dirty="0"/>
+              <a:rPr lang="en-US" b="1" dirty="0"/>
               <a:t>IO/NIO</a:t>
             </a:r>
-            <a:endParaRPr lang="ru-RU" b="1" i="1" dirty="0"/>
+            <a:endParaRPr lang="ru-RU" b="1" dirty="0"/>
           </a:p>
         </p:txBody>
       </p:sp>
@@ -7774,10 +7788,10 @@
           <a:lstStyle/>
           <a:p>
             <a:r>
-              <a:rPr lang="en-US" i="1" dirty="0"/>
-              <a:t>Paths	</a:t>
-            </a:r>
-            <a:endParaRPr lang="ru-RU" i="1" dirty="0"/>
+              <a:rPr lang="en-US" b="1" dirty="0"/>
+              <a:t>NIO Paths	</a:t>
+            </a:r>
+            <a:endParaRPr lang="ru-RU" b="1" dirty="0"/>
           </a:p>
         </p:txBody>
       </p:sp>
@@ -8198,10 +8212,10 @@
           <a:lstStyle/>
           <a:p>
             <a:r>
-              <a:rPr lang="en-US" i="1" dirty="0"/>
-              <a:t>Files</a:t>
-            </a:r>
-            <a:endParaRPr lang="ru-RU" i="1" dirty="0"/>
+              <a:rPr lang="en-US" b="1" dirty="0"/>
+              <a:t>NIO Files</a:t>
+            </a:r>
+            <a:endParaRPr lang="ru-RU" b="1" dirty="0"/>
           </a:p>
         </p:txBody>
       </p:sp>
@@ -8407,7 +8421,7 @@
           <p:cNvPr id="2" name="Title 1">
             <a:extLst>
               <a:ext uri="{FF2B5EF4-FFF2-40B4-BE49-F238E27FC236}">
-                <a16:creationId xmlns:a16="http://schemas.microsoft.com/office/drawing/2014/main" id="{8B0DA60C-2C2D-844A-B24D-69FAD537F71C}"/>
+                <a16:creationId xmlns:a16="http://schemas.microsoft.com/office/drawing/2014/main" id="{861FBC4B-FDEC-467D-A83E-8B8A5D096F8E}"/>
               </a:ext>
             </a:extLst>
           </p:cNvPr>
@@ -8424,10 +8438,9 @@
           <a:lstStyle/>
           <a:p>
             <a:r>
-              <a:rPr lang="en-US" i="1" dirty="0" err="1"/>
-              <a:t>OpenOptions</a:t>
-            </a:r>
-            <a:endParaRPr lang="ru-RU" i="1" dirty="0"/>
+              <a:rPr lang="en-RU" b="1" dirty="0"/>
+              <a:t>RandomAccessFile</a:t>
+            </a:r>
           </a:p>
         </p:txBody>
       </p:sp>
@@ -8436,7 +8449,7 @@
           <p:cNvPr id="3" name="Content Placeholder 2">
             <a:extLst>
               <a:ext uri="{FF2B5EF4-FFF2-40B4-BE49-F238E27FC236}">
-                <a16:creationId xmlns:a16="http://schemas.microsoft.com/office/drawing/2014/main" id="{A2D6EA14-6494-3D49-B2B1-B1618FA0B0AB}"/>
+                <a16:creationId xmlns:a16="http://schemas.microsoft.com/office/drawing/2014/main" id="{DD12A6CD-377B-DE49-8905-473F9A3C5347}"/>
               </a:ext>
             </a:extLst>
           </p:cNvPr>
@@ -8449,70 +8462,1400 @@
         </p:nvSpPr>
         <p:spPr/>
         <p:txBody>
-          <a:bodyPr>
-            <a:normAutofit fontScale="62500" lnSpcReduction="20000"/>
-          </a:bodyPr>
+          <a:bodyPr/>
           <a:lstStyle/>
           <a:p>
-            <a:r>
-              <a:rPr lang="en-US" dirty="0"/>
-              <a:t>WRITE – Opens the file for write access.</a:t>
-            </a:r>
-          </a:p>
-          <a:p>
-            <a:r>
-              <a:rPr lang="en-US" dirty="0"/>
-              <a:t>APPEND – Appends the new data to the end of the file. This option is used with the WRITE or CREATE options.</a:t>
-            </a:r>
-          </a:p>
-          <a:p>
-            <a:r>
-              <a:rPr lang="en-US" dirty="0"/>
-              <a:t>TRUNCATE_EXISTING – Truncates the file to zero bytes. This option is used with the WRITE option.</a:t>
-            </a:r>
-          </a:p>
-          <a:p>
-            <a:r>
-              <a:rPr lang="en-US" dirty="0"/>
-              <a:t>CREATE_NEW – Creates a new file and throws an exception if the file already exists.</a:t>
-            </a:r>
-          </a:p>
-          <a:p>
-            <a:r>
-              <a:rPr lang="en-US" dirty="0"/>
-              <a:t>CREATE – Opens the file if it exists or creates a new file if it does not.</a:t>
-            </a:r>
-          </a:p>
-          <a:p>
-            <a:r>
-              <a:rPr lang="en-US" dirty="0"/>
-              <a:t>DELETE_ON_CLOSE – Deletes the file when the stream is closed. This option is useful for temporary files.</a:t>
-            </a:r>
-          </a:p>
-          <a:p>
-            <a:r>
-              <a:rPr lang="en-US" dirty="0"/>
-              <a:t>SPARSE – Hints that a newly created file will be sparse. This advanced option is honored on some file systems, such as NTFS, where large files with data "gaps" can be stored in a more efficient manner where those empty gaps do not consume disk space.</a:t>
-            </a:r>
-          </a:p>
-          <a:p>
-            <a:r>
-              <a:rPr lang="en-US" dirty="0"/>
-              <a:t>SYNC – Keeps the file (both content and metadata) synchronized with the underlying storage device.</a:t>
-            </a:r>
-          </a:p>
-          <a:p>
-            <a:r>
-              <a:rPr lang="en-US" dirty="0"/>
-              <a:t>DSYNC – Keeps the file content synchronized with the underlying storage device.</a:t>
-            </a:r>
+            <a:pPr marL="0" indent="0">
+              <a:buNone/>
+            </a:pPr>
+            <a:r>
+              <a:rPr lang="ru-RU" dirty="0"/>
+              <a:t>Позволяет непоследовательный или </a:t>
+            </a:r>
+            <a:r>
+              <a:rPr lang="ru-RU" dirty="0" err="1"/>
+              <a:t>рандомный</a:t>
+            </a:r>
+            <a:r>
+              <a:rPr lang="ru-RU" dirty="0"/>
+              <a:t> доступ к файлу.</a:t>
+            </a:r>
+            <a:endParaRPr lang="en-GB" dirty="0"/>
+          </a:p>
+          <a:p>
+            <a:r>
+              <a:rPr lang="en-GB" dirty="0"/>
+              <a:t>position – Returns the channel's current position</a:t>
+            </a:r>
+          </a:p>
+          <a:p>
+            <a:r>
+              <a:rPr lang="en-GB" dirty="0"/>
+              <a:t>position(long) – Sets the channel's position</a:t>
+            </a:r>
+          </a:p>
+          <a:p>
+            <a:r>
+              <a:rPr lang="en-GB" dirty="0"/>
+              <a:t>read(</a:t>
+            </a:r>
+            <a:r>
+              <a:rPr lang="en-GB" dirty="0" err="1"/>
+              <a:t>ByteBuffer</a:t>
+            </a:r>
+            <a:r>
+              <a:rPr lang="en-GB" dirty="0"/>
+              <a:t>) – Reads bytes into the buffer from the channel</a:t>
+            </a:r>
+          </a:p>
+          <a:p>
+            <a:r>
+              <a:rPr lang="en-GB" dirty="0"/>
+              <a:t>write(</a:t>
+            </a:r>
+            <a:r>
+              <a:rPr lang="en-GB" dirty="0" err="1"/>
+              <a:t>ByteBuffer</a:t>
+            </a:r>
+            <a:r>
+              <a:rPr lang="en-GB" dirty="0"/>
+              <a:t>) – Writes bytes from the buffer to the channel</a:t>
+            </a:r>
+          </a:p>
+          <a:p>
+            <a:r>
+              <a:rPr lang="en-GB" dirty="0"/>
+              <a:t>truncate(long) – Truncates the file (or other entity) connected to the channel</a:t>
+            </a:r>
+          </a:p>
+          <a:p>
+            <a:endParaRPr lang="en-RU" dirty="0"/>
           </a:p>
         </p:txBody>
       </p:sp>
     </p:spTree>
     <p:extLst>
       <p:ext uri="{BB962C8B-B14F-4D97-AF65-F5344CB8AC3E}">
-        <p14:creationId xmlns:p14="http://schemas.microsoft.com/office/powerpoint/2010/main" val="53030545"/>
+        <p14:creationId xmlns:p14="http://schemas.microsoft.com/office/powerpoint/2010/main" val="2910475945"/>
+      </p:ext>
+    </p:extLst>
+  </p:cSld>
+  <p:clrMapOvr>
+    <a:masterClrMapping/>
+  </p:clrMapOvr>
+</p:sld>
+</file>
+
+<file path=ppt/slides/slide14.xml><?xml version="1.0" encoding="utf-8"?>
+<p:sld xmlns:a="http://schemas.openxmlformats.org/drawingml/2006/main" xmlns:r="http://schemas.openxmlformats.org/officeDocument/2006/relationships" xmlns:p="http://schemas.openxmlformats.org/presentationml/2006/main">
+  <p:cSld>
+    <p:spTree>
+      <p:nvGrpSpPr>
+        <p:cNvPr id="1" name=""/>
+        <p:cNvGrpSpPr/>
+        <p:nvPr/>
+      </p:nvGrpSpPr>
+      <p:grpSpPr>
+        <a:xfrm>
+          <a:off x="0" y="0"/>
+          <a:ext cx="0" cy="0"/>
+          <a:chOff x="0" y="0"/>
+          <a:chExt cx="0" cy="0"/>
+        </a:xfrm>
+      </p:grpSpPr>
+      <p:sp>
+        <p:nvSpPr>
+          <p:cNvPr id="2" name="Title 1">
+            <a:extLst>
+              <a:ext uri="{FF2B5EF4-FFF2-40B4-BE49-F238E27FC236}">
+                <a16:creationId xmlns:a16="http://schemas.microsoft.com/office/drawing/2014/main" id="{8B23CCFC-ADE3-D616-8BAE-9B4D7AFF6A63}"/>
+              </a:ext>
+            </a:extLst>
+          </p:cNvPr>
+          <p:cNvSpPr>
+            <a:spLocks noGrp="1"/>
+          </p:cNvSpPr>
+          <p:nvPr>
+            <p:ph type="title"/>
+          </p:nvPr>
+        </p:nvSpPr>
+        <p:spPr/>
+        <p:txBody>
+          <a:bodyPr/>
+          <a:lstStyle/>
+          <a:p>
+            <a:r>
+              <a:rPr lang="en-RU" b="1" dirty="0"/>
+              <a:t>NIO Channel</a:t>
+            </a:r>
+          </a:p>
+        </p:txBody>
+      </p:sp>
+      <p:sp>
+        <p:nvSpPr>
+          <p:cNvPr id="3" name="Content Placeholder 2">
+            <a:extLst>
+              <a:ext uri="{FF2B5EF4-FFF2-40B4-BE49-F238E27FC236}">
+                <a16:creationId xmlns:a16="http://schemas.microsoft.com/office/drawing/2014/main" id="{A9137610-418C-8F14-48EE-1E884F0D6EF6}"/>
+              </a:ext>
+            </a:extLst>
+          </p:cNvPr>
+          <p:cNvSpPr>
+            <a:spLocks noGrp="1"/>
+          </p:cNvSpPr>
+          <p:nvPr>
+            <p:ph idx="1"/>
+          </p:nvPr>
+        </p:nvSpPr>
+        <p:spPr/>
+        <p:txBody>
+          <a:bodyPr>
+            <a:normAutofit/>
+          </a:bodyPr>
+          <a:lstStyle/>
+          <a:p>
+            <a:pPr marL="0" indent="0">
+              <a:buNone/>
+            </a:pPr>
+            <a:r>
+              <a:rPr lang="ru-RU" dirty="0"/>
+              <a:t>Канал – это альтернатива стриму. </a:t>
+            </a:r>
+          </a:p>
+          <a:p>
+            <a:pPr lvl="1"/>
+            <a:r>
+              <a:rPr lang="ru-RU" dirty="0"/>
+              <a:t>В канал можно писать и читать из него.</a:t>
+            </a:r>
+          </a:p>
+          <a:p>
+            <a:pPr lvl="1"/>
+            <a:r>
+              <a:rPr lang="ru-RU" dirty="0"/>
+              <a:t>Каналы могут работать асинхронно.</a:t>
+            </a:r>
+          </a:p>
+          <a:p>
+            <a:pPr lvl="1"/>
+            <a:r>
+              <a:rPr lang="ru-RU" dirty="0"/>
+              <a:t>Каналы работают с буферами.</a:t>
+            </a:r>
+          </a:p>
+          <a:p>
+            <a:pPr marL="0" indent="0">
+              <a:buNone/>
+            </a:pPr>
+            <a:r>
+              <a:rPr lang="ru-RU" dirty="0"/>
+              <a:t>Реализации</a:t>
+            </a:r>
+            <a:r>
+              <a:rPr lang="en-US" dirty="0"/>
+              <a:t>:</a:t>
+            </a:r>
+          </a:p>
+          <a:p>
+            <a:pPr lvl="1"/>
+            <a:r>
+              <a:rPr lang="en-US" i="1" dirty="0" err="1"/>
+              <a:t>FileChannel</a:t>
+            </a:r>
+            <a:r>
+              <a:rPr lang="en-US" dirty="0"/>
+              <a:t> – </a:t>
+            </a:r>
+            <a:r>
+              <a:rPr lang="ru-RU" dirty="0"/>
+              <a:t>для работы с файлами.</a:t>
+            </a:r>
+          </a:p>
+          <a:p>
+            <a:pPr lvl="1"/>
+            <a:r>
+              <a:rPr lang="en-US" i="1" dirty="0" err="1"/>
+              <a:t>DatagramChannel</a:t>
+            </a:r>
+            <a:r>
+              <a:rPr lang="en-US" dirty="0"/>
+              <a:t> – </a:t>
+            </a:r>
+            <a:r>
+              <a:rPr lang="ru-RU" dirty="0"/>
+              <a:t>для работы через </a:t>
+            </a:r>
+            <a:r>
+              <a:rPr lang="en-US" i="1" dirty="0"/>
+              <a:t>UDP</a:t>
+            </a:r>
+            <a:r>
+              <a:rPr lang="en-US" dirty="0"/>
+              <a:t>.</a:t>
+            </a:r>
+          </a:p>
+          <a:p>
+            <a:pPr lvl="1"/>
+            <a:r>
+              <a:rPr lang="en-US" i="1" dirty="0" err="1"/>
+              <a:t>SocketChannel</a:t>
+            </a:r>
+            <a:r>
+              <a:rPr lang="en-US" dirty="0"/>
+              <a:t> – </a:t>
+            </a:r>
+            <a:r>
+              <a:rPr lang="ru-RU" dirty="0"/>
+              <a:t>для работы через </a:t>
+            </a:r>
+            <a:r>
+              <a:rPr lang="en-US" i="1" dirty="0"/>
+              <a:t>TCP</a:t>
+            </a:r>
+            <a:r>
+              <a:rPr lang="en-US" dirty="0"/>
+              <a:t>.</a:t>
+            </a:r>
+          </a:p>
+          <a:p>
+            <a:pPr lvl="1"/>
+            <a:r>
+              <a:rPr lang="en-US" i="1" dirty="0" err="1"/>
+              <a:t>ServerSocketChannel</a:t>
+            </a:r>
+            <a:r>
+              <a:rPr lang="en-US" dirty="0"/>
+              <a:t> – </a:t>
+            </a:r>
+            <a:r>
+              <a:rPr lang="ru-RU" dirty="0"/>
+              <a:t>для прослушивания входящего </a:t>
+            </a:r>
+            <a:r>
+              <a:rPr lang="en-US" i="1" dirty="0"/>
+              <a:t>TCP</a:t>
+            </a:r>
+            <a:r>
+              <a:rPr lang="ru-RU" dirty="0"/>
+              <a:t> соединения. Каждый раз создается </a:t>
+            </a:r>
+            <a:r>
+              <a:rPr lang="en-US" i="1" dirty="0" err="1"/>
+              <a:t>SocketChannel</a:t>
+            </a:r>
+            <a:r>
+              <a:rPr lang="ru-RU" dirty="0"/>
+              <a:t>.</a:t>
+            </a:r>
+            <a:endParaRPr lang="en-US" dirty="0"/>
+          </a:p>
+        </p:txBody>
+      </p:sp>
+      <p:pic>
+        <p:nvPicPr>
+          <p:cNvPr id="5" name="Picture 4">
+            <a:extLst>
+              <a:ext uri="{FF2B5EF4-FFF2-40B4-BE49-F238E27FC236}">
+                <a16:creationId xmlns:a16="http://schemas.microsoft.com/office/drawing/2014/main" id="{B5830618-6EE4-BD52-E12B-ECC7C28EE2E9}"/>
+              </a:ext>
+            </a:extLst>
+          </p:cNvPr>
+          <p:cNvPicPr>
+            <a:picLocks noChangeAspect="1"/>
+          </p:cNvPicPr>
+          <p:nvPr/>
+        </p:nvPicPr>
+        <p:blipFill>
+          <a:blip r:embed="rId2"/>
+          <a:stretch>
+            <a:fillRect/>
+          </a:stretch>
+        </p:blipFill>
+        <p:spPr>
+          <a:xfrm>
+            <a:off x="7081082" y="2429286"/>
+            <a:ext cx="3213100" cy="2197100"/>
+          </a:xfrm>
+          <a:prstGeom prst="rect">
+            <a:avLst/>
+          </a:prstGeom>
+        </p:spPr>
+      </p:pic>
+    </p:spTree>
+    <p:extLst>
+      <p:ext uri="{BB962C8B-B14F-4D97-AF65-F5344CB8AC3E}">
+        <p14:creationId xmlns:p14="http://schemas.microsoft.com/office/powerpoint/2010/main" val="3991303720"/>
+      </p:ext>
+    </p:extLst>
+  </p:cSld>
+  <p:clrMapOvr>
+    <a:masterClrMapping/>
+  </p:clrMapOvr>
+</p:sld>
+</file>
+
+<file path=ppt/slides/slide15.xml><?xml version="1.0" encoding="utf-8"?>
+<p:sld xmlns:a="http://schemas.openxmlformats.org/drawingml/2006/main" xmlns:r="http://schemas.openxmlformats.org/officeDocument/2006/relationships" xmlns:p="http://schemas.openxmlformats.org/presentationml/2006/main">
+  <p:cSld>
+    <p:spTree>
+      <p:nvGrpSpPr>
+        <p:cNvPr id="1" name=""/>
+        <p:cNvGrpSpPr/>
+        <p:nvPr/>
+      </p:nvGrpSpPr>
+      <p:grpSpPr>
+        <a:xfrm>
+          <a:off x="0" y="0"/>
+          <a:ext cx="0" cy="0"/>
+          <a:chOff x="0" y="0"/>
+          <a:chExt cx="0" cy="0"/>
+        </a:xfrm>
+      </p:grpSpPr>
+      <p:sp>
+        <p:nvSpPr>
+          <p:cNvPr id="2" name="Title 1">
+            <a:extLst>
+              <a:ext uri="{FF2B5EF4-FFF2-40B4-BE49-F238E27FC236}">
+                <a16:creationId xmlns:a16="http://schemas.microsoft.com/office/drawing/2014/main" id="{F95D249C-8BBF-7A6E-5C98-F6412924E0AA}"/>
+              </a:ext>
+            </a:extLst>
+          </p:cNvPr>
+          <p:cNvSpPr>
+            <a:spLocks noGrp="1"/>
+          </p:cNvSpPr>
+          <p:nvPr>
+            <p:ph type="title"/>
+          </p:nvPr>
+        </p:nvSpPr>
+        <p:spPr/>
+        <p:txBody>
+          <a:bodyPr/>
+          <a:lstStyle/>
+          <a:p>
+            <a:r>
+              <a:rPr lang="en-US" b="1" dirty="0"/>
+              <a:t>NIO Buffer</a:t>
+            </a:r>
+            <a:endParaRPr lang="en-RU" b="1" dirty="0"/>
+          </a:p>
+        </p:txBody>
+      </p:sp>
+      <p:sp>
+        <p:nvSpPr>
+          <p:cNvPr id="3" name="Content Placeholder 2">
+            <a:extLst>
+              <a:ext uri="{FF2B5EF4-FFF2-40B4-BE49-F238E27FC236}">
+                <a16:creationId xmlns:a16="http://schemas.microsoft.com/office/drawing/2014/main" id="{64C29320-2D51-8797-39DB-27FFD3D770B8}"/>
+              </a:ext>
+            </a:extLst>
+          </p:cNvPr>
+          <p:cNvSpPr>
+            <a:spLocks noGrp="1"/>
+          </p:cNvSpPr>
+          <p:nvPr>
+            <p:ph idx="1"/>
+          </p:nvPr>
+        </p:nvSpPr>
+        <p:spPr/>
+        <p:txBody>
+          <a:bodyPr/>
+          <a:lstStyle/>
+          <a:p>
+            <a:r>
+              <a:rPr lang="ru-RU" dirty="0"/>
+              <a:t>Данные из каналов читаются из канала в буфер и наоборот.</a:t>
+            </a:r>
+            <a:endParaRPr lang="en-US" dirty="0"/>
+          </a:p>
+          <a:p>
+            <a:r>
+              <a:rPr lang="ru-RU" dirty="0"/>
+              <a:t>Этапы чтения из буфера</a:t>
+            </a:r>
+            <a:r>
+              <a:rPr lang="en-US" dirty="0"/>
+              <a:t>:</a:t>
+            </a:r>
+          </a:p>
+          <a:p>
+            <a:pPr lvl="1"/>
+            <a:r>
+              <a:rPr lang="ru-RU" dirty="0"/>
+              <a:t>Запись данных в буфер.</a:t>
+            </a:r>
+          </a:p>
+          <a:p>
+            <a:pPr lvl="1"/>
+            <a:r>
+              <a:rPr lang="ru-RU" dirty="0"/>
+              <a:t>Переключение в режим чтения (метод </a:t>
+            </a:r>
+            <a:r>
+              <a:rPr lang="en-US" i="1" dirty="0"/>
+              <a:t>flip()</a:t>
+            </a:r>
+            <a:r>
+              <a:rPr lang="ru-RU" dirty="0"/>
+              <a:t>)</a:t>
+            </a:r>
+            <a:r>
+              <a:rPr lang="en-US" dirty="0"/>
+              <a:t>.</a:t>
+            </a:r>
+          </a:p>
+          <a:p>
+            <a:pPr lvl="1"/>
+            <a:r>
+              <a:rPr lang="ru-RU" dirty="0"/>
+              <a:t>Чтение данных из буфера.</a:t>
+            </a:r>
+          </a:p>
+          <a:p>
+            <a:pPr lvl="1"/>
+            <a:r>
+              <a:rPr lang="ru-RU" dirty="0"/>
+              <a:t>Переключение в режим записи (метод </a:t>
+            </a:r>
+            <a:r>
+              <a:rPr lang="en-US" i="1" dirty="0"/>
+              <a:t>clear() – </a:t>
+            </a:r>
+            <a:r>
+              <a:rPr lang="ru-RU" dirty="0"/>
+              <a:t>зачищает буфер, метод </a:t>
+            </a:r>
+            <a:r>
+              <a:rPr lang="en-US" i="1" dirty="0"/>
+              <a:t>compact() –</a:t>
+            </a:r>
+            <a:r>
+              <a:rPr lang="ru-RU" i="1" dirty="0"/>
+              <a:t> </a:t>
+            </a:r>
+            <a:r>
+              <a:rPr lang="ru-RU" dirty="0"/>
+              <a:t>зачищает все прочитанные данные из буфера).</a:t>
+            </a:r>
+            <a:endParaRPr lang="en-US" dirty="0"/>
+          </a:p>
+          <a:p>
+            <a:endParaRPr lang="ru-RU" dirty="0"/>
+          </a:p>
+          <a:p>
+            <a:endParaRPr lang="en-RU" dirty="0"/>
+          </a:p>
+        </p:txBody>
+      </p:sp>
+    </p:spTree>
+    <p:extLst>
+      <p:ext uri="{BB962C8B-B14F-4D97-AF65-F5344CB8AC3E}">
+        <p14:creationId xmlns:p14="http://schemas.microsoft.com/office/powerpoint/2010/main" val="2860400558"/>
+      </p:ext>
+    </p:extLst>
+  </p:cSld>
+  <p:clrMapOvr>
+    <a:masterClrMapping/>
+  </p:clrMapOvr>
+</p:sld>
+</file>
+
+<file path=ppt/slides/slide16.xml><?xml version="1.0" encoding="utf-8"?>
+<p:sld xmlns:a="http://schemas.openxmlformats.org/drawingml/2006/main" xmlns:r="http://schemas.openxmlformats.org/officeDocument/2006/relationships" xmlns:p="http://schemas.openxmlformats.org/presentationml/2006/main">
+  <p:cSld>
+    <p:spTree>
+      <p:nvGrpSpPr>
+        <p:cNvPr id="1" name=""/>
+        <p:cNvGrpSpPr/>
+        <p:nvPr/>
+      </p:nvGrpSpPr>
+      <p:grpSpPr>
+        <a:xfrm>
+          <a:off x="0" y="0"/>
+          <a:ext cx="0" cy="0"/>
+          <a:chOff x="0" y="0"/>
+          <a:chExt cx="0" cy="0"/>
+        </a:xfrm>
+      </p:grpSpPr>
+      <p:sp>
+        <p:nvSpPr>
+          <p:cNvPr id="2" name="Title 1">
+            <a:extLst>
+              <a:ext uri="{FF2B5EF4-FFF2-40B4-BE49-F238E27FC236}">
+                <a16:creationId xmlns:a16="http://schemas.microsoft.com/office/drawing/2014/main" id="{78BFE027-5779-EA30-E797-1CB7A6A6DE22}"/>
+              </a:ext>
+            </a:extLst>
+          </p:cNvPr>
+          <p:cNvSpPr>
+            <a:spLocks noGrp="1"/>
+          </p:cNvSpPr>
+          <p:nvPr>
+            <p:ph type="title"/>
+          </p:nvPr>
+        </p:nvSpPr>
+        <p:spPr/>
+        <p:txBody>
+          <a:bodyPr/>
+          <a:lstStyle/>
+          <a:p>
+            <a:r>
+              <a:rPr lang="en-RU" b="1" dirty="0"/>
+              <a:t>NIO Buffer</a:t>
+            </a:r>
+          </a:p>
+        </p:txBody>
+      </p:sp>
+      <p:sp>
+        <p:nvSpPr>
+          <p:cNvPr id="3" name="Content Placeholder 2">
+            <a:extLst>
+              <a:ext uri="{FF2B5EF4-FFF2-40B4-BE49-F238E27FC236}">
+                <a16:creationId xmlns:a16="http://schemas.microsoft.com/office/drawing/2014/main" id="{ABA2C80F-A64A-93CA-DD7A-8E4525D6B74B}"/>
+              </a:ext>
+            </a:extLst>
+          </p:cNvPr>
+          <p:cNvSpPr>
+            <a:spLocks noGrp="1"/>
+          </p:cNvSpPr>
+          <p:nvPr>
+            <p:ph idx="1"/>
+          </p:nvPr>
+        </p:nvSpPr>
+        <p:spPr>
+          <a:xfrm>
+            <a:off x="680321" y="2336873"/>
+            <a:ext cx="5568081" cy="3599316"/>
+          </a:xfrm>
+        </p:spPr>
+        <p:txBody>
+          <a:bodyPr>
+            <a:normAutofit fontScale="92500" lnSpcReduction="10000"/>
+          </a:bodyPr>
+          <a:lstStyle/>
+          <a:p>
+            <a:pPr marL="0" indent="0">
+              <a:buNone/>
+            </a:pPr>
+            <a:r>
+              <a:rPr lang="ru-RU" dirty="0"/>
+              <a:t>У буфера есть три свойства</a:t>
+            </a:r>
+            <a:r>
+              <a:rPr lang="en-US" dirty="0"/>
+              <a:t>:</a:t>
+            </a:r>
+          </a:p>
+          <a:p>
+            <a:pPr lvl="1"/>
+            <a:r>
+              <a:rPr lang="en-US" i="1" dirty="0"/>
+              <a:t>Capacity</a:t>
+            </a:r>
+            <a:r>
+              <a:rPr lang="en-US" dirty="0"/>
+              <a:t> </a:t>
+            </a:r>
+            <a:r>
+              <a:rPr lang="ru-RU" dirty="0"/>
+              <a:t>-</a:t>
+            </a:r>
+            <a:r>
+              <a:rPr lang="en-US" dirty="0"/>
+              <a:t> </a:t>
+            </a:r>
+            <a:r>
+              <a:rPr lang="ru-RU" dirty="0"/>
+              <a:t>фиксированная вместимость буфера.</a:t>
+            </a:r>
+            <a:endParaRPr lang="en-US" dirty="0"/>
+          </a:p>
+          <a:p>
+            <a:pPr lvl="1"/>
+            <a:r>
+              <a:rPr lang="en-US" i="1" dirty="0"/>
+              <a:t>Position</a:t>
+            </a:r>
+            <a:r>
+              <a:rPr lang="en-US" dirty="0"/>
+              <a:t> </a:t>
+            </a:r>
+            <a:r>
+              <a:rPr lang="ru-RU" dirty="0"/>
+              <a:t>- позиция данных в буфере (от 0 до </a:t>
+            </a:r>
+            <a:r>
+              <a:rPr lang="en-US" i="1" dirty="0"/>
+              <a:t>Capacity</a:t>
+            </a:r>
+            <a:r>
+              <a:rPr lang="en-US" dirty="0"/>
+              <a:t>-1</a:t>
+            </a:r>
+            <a:r>
+              <a:rPr lang="ru-RU" dirty="0"/>
+              <a:t>). При чтении позиция обнуляется.</a:t>
+            </a:r>
+          </a:p>
+          <a:p>
+            <a:pPr lvl="1"/>
+            <a:r>
+              <a:rPr lang="en-US" i="1" dirty="0"/>
+              <a:t>Limit</a:t>
+            </a:r>
+            <a:r>
+              <a:rPr lang="en-US" dirty="0"/>
+              <a:t> – </a:t>
+            </a:r>
+            <a:r>
+              <a:rPr lang="ru-RU" dirty="0"/>
+              <a:t>при записи </a:t>
+            </a:r>
+            <a:r>
+              <a:rPr lang="en-US" i="1" dirty="0"/>
+              <a:t>limit = capacity</a:t>
+            </a:r>
+            <a:r>
+              <a:rPr lang="ru-RU" dirty="0"/>
+              <a:t>.</a:t>
+            </a:r>
+            <a:r>
+              <a:rPr lang="en-US" dirty="0"/>
+              <a:t> </a:t>
+            </a:r>
+            <a:r>
+              <a:rPr lang="ru-RU" dirty="0"/>
+              <a:t>При чтении </a:t>
+            </a:r>
+            <a:r>
+              <a:rPr lang="en-US" i="1" dirty="0"/>
+              <a:t>limit = position</a:t>
+            </a:r>
+            <a:r>
+              <a:rPr lang="ru-RU" dirty="0"/>
+              <a:t>.</a:t>
+            </a:r>
+          </a:p>
+          <a:p>
+            <a:pPr marL="0" indent="0">
+              <a:buNone/>
+            </a:pPr>
+            <a:r>
+              <a:rPr lang="ru-RU" dirty="0"/>
+              <a:t>Типы буферов</a:t>
+            </a:r>
+            <a:r>
+              <a:rPr lang="en-US" dirty="0"/>
+              <a:t>:</a:t>
+            </a:r>
+          </a:p>
+          <a:p>
+            <a:pPr lvl="1"/>
+            <a:r>
+              <a:rPr lang="en-US" i="1" dirty="0" err="1"/>
+              <a:t>ByteBuffer</a:t>
+            </a:r>
+            <a:endParaRPr lang="en-US" i="1" dirty="0"/>
+          </a:p>
+          <a:p>
+            <a:pPr lvl="1"/>
+            <a:r>
+              <a:rPr lang="en-US" i="1" dirty="0" err="1"/>
+              <a:t>MappedByteBuffer</a:t>
+            </a:r>
+            <a:endParaRPr lang="en-US" i="1" dirty="0"/>
+          </a:p>
+          <a:p>
+            <a:pPr lvl="1"/>
+            <a:r>
+              <a:rPr lang="en-US" i="1" dirty="0"/>
+              <a:t>*primitive type*Buffer</a:t>
+            </a:r>
+            <a:endParaRPr lang="ru-RU" i="1" dirty="0"/>
+          </a:p>
+        </p:txBody>
+      </p:sp>
+      <p:pic>
+        <p:nvPicPr>
+          <p:cNvPr id="5" name="Picture 4">
+            <a:extLst>
+              <a:ext uri="{FF2B5EF4-FFF2-40B4-BE49-F238E27FC236}">
+                <a16:creationId xmlns:a16="http://schemas.microsoft.com/office/drawing/2014/main" id="{7FC5F446-46D6-0BE0-4347-6252B88E8D49}"/>
+              </a:ext>
+            </a:extLst>
+          </p:cNvPr>
+          <p:cNvPicPr>
+            <a:picLocks noChangeAspect="1"/>
+          </p:cNvPicPr>
+          <p:nvPr/>
+        </p:nvPicPr>
+        <p:blipFill>
+          <a:blip r:embed="rId2"/>
+          <a:stretch>
+            <a:fillRect/>
+          </a:stretch>
+        </p:blipFill>
+        <p:spPr>
+          <a:xfrm>
+            <a:off x="6248402" y="2741365"/>
+            <a:ext cx="4130998" cy="2790331"/>
+          </a:xfrm>
+          <a:prstGeom prst="rect">
+            <a:avLst/>
+          </a:prstGeom>
+        </p:spPr>
+      </p:pic>
+    </p:spTree>
+    <p:extLst>
+      <p:ext uri="{BB962C8B-B14F-4D97-AF65-F5344CB8AC3E}">
+        <p14:creationId xmlns:p14="http://schemas.microsoft.com/office/powerpoint/2010/main" val="785772978"/>
+      </p:ext>
+    </p:extLst>
+  </p:cSld>
+  <p:clrMapOvr>
+    <a:masterClrMapping/>
+  </p:clrMapOvr>
+</p:sld>
+</file>
+
+<file path=ppt/slides/slide17.xml><?xml version="1.0" encoding="utf-8"?>
+<p:sld xmlns:a="http://schemas.openxmlformats.org/drawingml/2006/main" xmlns:r="http://schemas.openxmlformats.org/officeDocument/2006/relationships" xmlns:p="http://schemas.openxmlformats.org/presentationml/2006/main">
+  <p:cSld>
+    <p:spTree>
+      <p:nvGrpSpPr>
+        <p:cNvPr id="1" name=""/>
+        <p:cNvGrpSpPr/>
+        <p:nvPr/>
+      </p:nvGrpSpPr>
+      <p:grpSpPr>
+        <a:xfrm>
+          <a:off x="0" y="0"/>
+          <a:ext cx="0" cy="0"/>
+          <a:chOff x="0" y="0"/>
+          <a:chExt cx="0" cy="0"/>
+        </a:xfrm>
+      </p:grpSpPr>
+      <p:sp>
+        <p:nvSpPr>
+          <p:cNvPr id="2" name="Title 1">
+            <a:extLst>
+              <a:ext uri="{FF2B5EF4-FFF2-40B4-BE49-F238E27FC236}">
+                <a16:creationId xmlns:a16="http://schemas.microsoft.com/office/drawing/2014/main" id="{CB3BDD19-84C3-BDE1-3C1B-6DB31BB8F86F}"/>
+              </a:ext>
+            </a:extLst>
+          </p:cNvPr>
+          <p:cNvSpPr>
+            <a:spLocks noGrp="1"/>
+          </p:cNvSpPr>
+          <p:nvPr>
+            <p:ph type="title"/>
+          </p:nvPr>
+        </p:nvSpPr>
+        <p:spPr/>
+        <p:txBody>
+          <a:bodyPr/>
+          <a:lstStyle/>
+          <a:p>
+            <a:r>
+              <a:rPr lang="en-US" b="1" dirty="0"/>
+              <a:t>NIO </a:t>
+            </a:r>
+            <a:r>
+              <a:rPr lang="en-RU" b="1" dirty="0"/>
+              <a:t>ByteBuffer</a:t>
+            </a:r>
+          </a:p>
+        </p:txBody>
+      </p:sp>
+      <p:sp>
+        <p:nvSpPr>
+          <p:cNvPr id="3" name="Content Placeholder 2">
+            <a:extLst>
+              <a:ext uri="{FF2B5EF4-FFF2-40B4-BE49-F238E27FC236}">
+                <a16:creationId xmlns:a16="http://schemas.microsoft.com/office/drawing/2014/main" id="{9CB9830B-583E-2D3B-95BF-BE14245900A3}"/>
+              </a:ext>
+            </a:extLst>
+          </p:cNvPr>
+          <p:cNvSpPr>
+            <a:spLocks noGrp="1"/>
+          </p:cNvSpPr>
+          <p:nvPr>
+            <p:ph idx="1"/>
+          </p:nvPr>
+        </p:nvSpPr>
+        <p:spPr/>
+        <p:txBody>
+          <a:bodyPr>
+            <a:normAutofit fontScale="70000" lnSpcReduction="20000"/>
+          </a:bodyPr>
+          <a:lstStyle/>
+          <a:p>
+            <a:r>
+              <a:rPr lang="en-GB" i="1" dirty="0"/>
+              <a:t>allocate() –</a:t>
+            </a:r>
+            <a:r>
+              <a:rPr lang="ru-RU" i="1" dirty="0"/>
+              <a:t> </a:t>
+            </a:r>
+            <a:r>
+              <a:rPr lang="ru-RU" dirty="0"/>
+              <a:t>получает объект буфера с указанной вместимостью.</a:t>
+            </a:r>
+          </a:p>
+          <a:p>
+            <a:r>
+              <a:rPr lang="en-US" i="1" dirty="0" err="1"/>
+              <a:t>channel.read</a:t>
+            </a:r>
+            <a:r>
+              <a:rPr lang="en-US" i="1" dirty="0"/>
+              <a:t>()</a:t>
+            </a:r>
+            <a:r>
+              <a:rPr lang="en-US" dirty="0"/>
+              <a:t> – </a:t>
+            </a:r>
+            <a:r>
+              <a:rPr lang="ru-RU" dirty="0"/>
+              <a:t>запись данных в буфер из канала.</a:t>
+            </a:r>
+          </a:p>
+          <a:p>
+            <a:r>
+              <a:rPr lang="en-US" i="1" dirty="0"/>
+              <a:t>put() – </a:t>
+            </a:r>
+            <a:r>
+              <a:rPr lang="ru-RU" dirty="0"/>
+              <a:t>запись данных в буфер напрямую</a:t>
+            </a:r>
+            <a:r>
+              <a:rPr lang="ru-RU" i="1" dirty="0"/>
+              <a:t>.</a:t>
+            </a:r>
+            <a:endParaRPr lang="en-US" i="1" dirty="0"/>
+          </a:p>
+          <a:p>
+            <a:r>
+              <a:rPr lang="en-US" i="1" dirty="0"/>
+              <a:t>flip() – </a:t>
+            </a:r>
+            <a:r>
+              <a:rPr lang="ru-RU" dirty="0"/>
+              <a:t>переключает режим с записи на чтение.</a:t>
+            </a:r>
+          </a:p>
+          <a:p>
+            <a:r>
+              <a:rPr lang="en-US" i="1" dirty="0" err="1"/>
+              <a:t>channel.write</a:t>
+            </a:r>
+            <a:r>
+              <a:rPr lang="en-US" i="1" dirty="0"/>
+              <a:t>() – </a:t>
+            </a:r>
+            <a:r>
+              <a:rPr lang="ru-RU" dirty="0"/>
+              <a:t>чтение данных из буфера в канал.</a:t>
+            </a:r>
+          </a:p>
+          <a:p>
+            <a:r>
+              <a:rPr lang="en-US" i="1" dirty="0"/>
+              <a:t>get() </a:t>
+            </a:r>
+            <a:r>
+              <a:rPr lang="en-US" dirty="0"/>
+              <a:t>– </a:t>
+            </a:r>
+            <a:r>
+              <a:rPr lang="ru-RU" dirty="0"/>
+              <a:t>чтение данных из буфера напрямую.</a:t>
+            </a:r>
+          </a:p>
+          <a:p>
+            <a:r>
+              <a:rPr lang="en-US" i="1" dirty="0"/>
+              <a:t>rewind() – </a:t>
+            </a:r>
+            <a:r>
+              <a:rPr lang="ru-RU" dirty="0"/>
+              <a:t>ставит</a:t>
+            </a:r>
+            <a:r>
+              <a:rPr lang="ru-RU" i="1" dirty="0"/>
+              <a:t> </a:t>
+            </a:r>
+            <a:r>
+              <a:rPr lang="en-US" i="1" dirty="0"/>
+              <a:t>position</a:t>
+            </a:r>
+            <a:r>
+              <a:rPr lang="ru-RU" i="1" dirty="0"/>
+              <a:t> </a:t>
+            </a:r>
+            <a:r>
+              <a:rPr lang="en-US" i="1" dirty="0"/>
+              <a:t>=</a:t>
+            </a:r>
+            <a:r>
+              <a:rPr lang="ru-RU" i="1" dirty="0"/>
+              <a:t> </a:t>
+            </a:r>
+            <a:r>
+              <a:rPr lang="en-US" dirty="0"/>
+              <a:t>0</a:t>
+            </a:r>
+            <a:r>
+              <a:rPr lang="en-US" i="1" dirty="0"/>
+              <a:t> </a:t>
+            </a:r>
+            <a:r>
+              <a:rPr lang="ru-RU" dirty="0"/>
+              <a:t>и позволяет перечитать данные.</a:t>
+            </a:r>
+            <a:endParaRPr lang="en-US" dirty="0"/>
+          </a:p>
+          <a:p>
+            <a:r>
+              <a:rPr lang="en-US" i="1" dirty="0"/>
+              <a:t>clear() </a:t>
+            </a:r>
+            <a:r>
+              <a:rPr lang="en-US" dirty="0"/>
+              <a:t>– </a:t>
+            </a:r>
+            <a:r>
+              <a:rPr lang="ru-RU" dirty="0"/>
+              <a:t>ставит </a:t>
+            </a:r>
+            <a:r>
+              <a:rPr lang="en-US" i="1" dirty="0"/>
+              <a:t>position = </a:t>
+            </a:r>
+            <a:r>
+              <a:rPr lang="en-US" dirty="0"/>
+              <a:t>0, </a:t>
+            </a:r>
+            <a:r>
+              <a:rPr lang="ru-RU" dirty="0"/>
+              <a:t>а </a:t>
+            </a:r>
+            <a:r>
+              <a:rPr lang="en-US" i="1" dirty="0"/>
+              <a:t>limit = capacity,</a:t>
+            </a:r>
+            <a:r>
+              <a:rPr lang="en-US" dirty="0"/>
+              <a:t> </a:t>
+            </a:r>
+            <a:r>
+              <a:rPr lang="ru-RU" dirty="0"/>
+              <a:t>таким образом переписывая данные.</a:t>
+            </a:r>
+          </a:p>
+          <a:p>
+            <a:r>
+              <a:rPr lang="en-US" i="1" dirty="0"/>
+              <a:t>compact() </a:t>
+            </a:r>
+            <a:r>
+              <a:rPr lang="ru-RU" i="1" dirty="0"/>
+              <a:t>–</a:t>
+            </a:r>
+            <a:r>
+              <a:rPr lang="ru-RU" dirty="0"/>
+              <a:t> копирует непрочитанные данные в начало буфера и выставляет </a:t>
+            </a:r>
+            <a:r>
+              <a:rPr lang="en-US" i="1" dirty="0"/>
+              <a:t>position</a:t>
+            </a:r>
+            <a:r>
+              <a:rPr lang="ru-RU" i="1" dirty="0"/>
+              <a:t> = </a:t>
+            </a:r>
+            <a:r>
+              <a:rPr lang="en-US" i="1" dirty="0"/>
+              <a:t>limit</a:t>
+            </a:r>
+            <a:r>
+              <a:rPr lang="en-US" dirty="0"/>
+              <a:t>, </a:t>
+            </a:r>
+            <a:r>
+              <a:rPr lang="ru-RU" dirty="0"/>
+              <a:t>а затем </a:t>
+            </a:r>
+            <a:r>
+              <a:rPr lang="en-US" i="1" dirty="0"/>
+              <a:t>limit </a:t>
+            </a:r>
+            <a:r>
+              <a:rPr lang="ru-RU" i="1" dirty="0"/>
+              <a:t>= </a:t>
+            </a:r>
+            <a:r>
+              <a:rPr lang="en-US" i="1" dirty="0"/>
+              <a:t>capacity.</a:t>
+            </a:r>
+            <a:endParaRPr lang="ru-RU" i="1" dirty="0"/>
+          </a:p>
+          <a:p>
+            <a:r>
+              <a:rPr lang="en-RU" i="1" dirty="0"/>
+              <a:t>mark() – </a:t>
+            </a:r>
+            <a:r>
+              <a:rPr lang="ru-RU" dirty="0"/>
+              <a:t>отмечает </a:t>
+            </a:r>
+            <a:r>
+              <a:rPr lang="en-US" i="1" dirty="0"/>
+              <a:t>position</a:t>
+            </a:r>
+            <a:r>
+              <a:rPr lang="ru-RU" dirty="0"/>
+              <a:t>, к которой можно будет вернуться при помощи метода</a:t>
+            </a:r>
+            <a:r>
+              <a:rPr lang="en-US" dirty="0"/>
+              <a:t> </a:t>
+            </a:r>
+            <a:r>
+              <a:rPr lang="en-GB" i="1" dirty="0"/>
+              <a:t>reset()</a:t>
+            </a:r>
+            <a:endParaRPr lang="en-RU" i="1" dirty="0"/>
+          </a:p>
+        </p:txBody>
+      </p:sp>
+    </p:spTree>
+    <p:extLst>
+      <p:ext uri="{BB962C8B-B14F-4D97-AF65-F5344CB8AC3E}">
+        <p14:creationId xmlns:p14="http://schemas.microsoft.com/office/powerpoint/2010/main" val="3895999489"/>
+      </p:ext>
+    </p:extLst>
+  </p:cSld>
+  <p:clrMapOvr>
+    <a:masterClrMapping/>
+  </p:clrMapOvr>
+</p:sld>
+</file>
+
+<file path=ppt/slides/slide18.xml><?xml version="1.0" encoding="utf-8"?>
+<p:sld xmlns:a="http://schemas.openxmlformats.org/drawingml/2006/main" xmlns:r="http://schemas.openxmlformats.org/officeDocument/2006/relationships" xmlns:p="http://schemas.openxmlformats.org/presentationml/2006/main">
+  <p:cSld>
+    <p:spTree>
+      <p:nvGrpSpPr>
+        <p:cNvPr id="1" name=""/>
+        <p:cNvGrpSpPr/>
+        <p:nvPr/>
+      </p:nvGrpSpPr>
+      <p:grpSpPr>
+        <a:xfrm>
+          <a:off x="0" y="0"/>
+          <a:ext cx="0" cy="0"/>
+          <a:chOff x="0" y="0"/>
+          <a:chExt cx="0" cy="0"/>
+        </a:xfrm>
+      </p:grpSpPr>
+      <p:sp>
+        <p:nvSpPr>
+          <p:cNvPr id="2" name="Title 1">
+            <a:extLst>
+              <a:ext uri="{FF2B5EF4-FFF2-40B4-BE49-F238E27FC236}">
+                <a16:creationId xmlns:a16="http://schemas.microsoft.com/office/drawing/2014/main" id="{43E6C5D3-0CE9-998C-CB7B-6ABB44DEEA41}"/>
+              </a:ext>
+            </a:extLst>
+          </p:cNvPr>
+          <p:cNvSpPr>
+            <a:spLocks noGrp="1"/>
+          </p:cNvSpPr>
+          <p:nvPr>
+            <p:ph type="title"/>
+          </p:nvPr>
+        </p:nvSpPr>
+        <p:spPr/>
+        <p:txBody>
+          <a:bodyPr/>
+          <a:lstStyle/>
+          <a:p>
+            <a:r>
+              <a:rPr lang="en-RU" b="1" dirty="0"/>
+              <a:t>NIO Scatter/Gather</a:t>
+            </a:r>
+          </a:p>
+        </p:txBody>
+      </p:sp>
+      <p:pic>
+        <p:nvPicPr>
+          <p:cNvPr id="7" name="Content Placeholder 6">
+            <a:extLst>
+              <a:ext uri="{FF2B5EF4-FFF2-40B4-BE49-F238E27FC236}">
+                <a16:creationId xmlns:a16="http://schemas.microsoft.com/office/drawing/2014/main" id="{3EB40D98-FABA-664C-6226-52D8F30A2480}"/>
+              </a:ext>
+            </a:extLst>
+          </p:cNvPr>
+          <p:cNvPicPr>
+            <a:picLocks noGrp="1" noChangeAspect="1"/>
+          </p:cNvPicPr>
+          <p:nvPr>
+            <p:ph idx="1"/>
+          </p:nvPr>
+        </p:nvPicPr>
+        <p:blipFill>
+          <a:blip r:embed="rId2"/>
+          <a:stretch>
+            <a:fillRect/>
+          </a:stretch>
+        </p:blipFill>
+        <p:spPr>
+          <a:xfrm>
+            <a:off x="680321" y="2605881"/>
+            <a:ext cx="3340100" cy="2975410"/>
+          </a:xfrm>
+        </p:spPr>
+      </p:pic>
+      <p:pic>
+        <p:nvPicPr>
+          <p:cNvPr id="9" name="Picture 8">
+            <a:extLst>
+              <a:ext uri="{FF2B5EF4-FFF2-40B4-BE49-F238E27FC236}">
+                <a16:creationId xmlns:a16="http://schemas.microsoft.com/office/drawing/2014/main" id="{5B8C4F30-E7E9-D9E3-A5A1-EC2F9A0C02FF}"/>
+              </a:ext>
+            </a:extLst>
+          </p:cNvPr>
+          <p:cNvPicPr>
+            <a:picLocks noChangeAspect="1"/>
+          </p:cNvPicPr>
+          <p:nvPr/>
+        </p:nvPicPr>
+        <p:blipFill>
+          <a:blip r:embed="rId3"/>
+          <a:stretch>
+            <a:fillRect/>
+          </a:stretch>
+        </p:blipFill>
+        <p:spPr>
+          <a:xfrm>
+            <a:off x="6954081" y="2605882"/>
+            <a:ext cx="3407040" cy="2914768"/>
+          </a:xfrm>
+          <a:prstGeom prst="rect">
+            <a:avLst/>
+          </a:prstGeom>
+        </p:spPr>
+      </p:pic>
+      <p:sp>
+        <p:nvSpPr>
+          <p:cNvPr id="11" name="TextBox 10">
+            <a:extLst>
+              <a:ext uri="{FF2B5EF4-FFF2-40B4-BE49-F238E27FC236}">
+                <a16:creationId xmlns:a16="http://schemas.microsoft.com/office/drawing/2014/main" id="{F63319A7-3732-28E8-98B9-FE786632DA28}"/>
+              </a:ext>
+            </a:extLst>
+          </p:cNvPr>
+          <p:cNvSpPr txBox="1"/>
+          <p:nvPr/>
+        </p:nvSpPr>
+        <p:spPr>
+          <a:xfrm>
+            <a:off x="4844583" y="3554083"/>
+            <a:ext cx="1285336" cy="646331"/>
+          </a:xfrm>
+          <a:prstGeom prst="rect">
+            <a:avLst/>
+          </a:prstGeom>
+          <a:noFill/>
+        </p:spPr>
+        <p:txBody>
+          <a:bodyPr wrap="square" rtlCol="0">
+            <a:spAutoFit/>
+          </a:bodyPr>
+          <a:lstStyle/>
+          <a:p>
+            <a:pPr algn="ctr"/>
+            <a:r>
+              <a:rPr lang="en-RU" dirty="0"/>
+              <a:t>Scatter =&gt;</a:t>
+            </a:r>
+          </a:p>
+          <a:p>
+            <a:r>
+              <a:rPr lang="en-RU" dirty="0"/>
+              <a:t>&lt;= Gather</a:t>
+            </a:r>
+          </a:p>
+        </p:txBody>
+      </p:sp>
+    </p:spTree>
+    <p:extLst>
+      <p:ext uri="{BB962C8B-B14F-4D97-AF65-F5344CB8AC3E}">
+        <p14:creationId xmlns:p14="http://schemas.microsoft.com/office/powerpoint/2010/main" val="1482482963"/>
+      </p:ext>
+    </p:extLst>
+  </p:cSld>
+  <p:clrMapOvr>
+    <a:masterClrMapping/>
+  </p:clrMapOvr>
+</p:sld>
+</file>
+
+<file path=ppt/slides/slide19.xml><?xml version="1.0" encoding="utf-8"?>
+<p:sld xmlns:a="http://schemas.openxmlformats.org/drawingml/2006/main" xmlns:r="http://schemas.openxmlformats.org/officeDocument/2006/relationships" xmlns:p="http://schemas.openxmlformats.org/presentationml/2006/main">
+  <p:cSld>
+    <p:spTree>
+      <p:nvGrpSpPr>
+        <p:cNvPr id="1" name=""/>
+        <p:cNvGrpSpPr/>
+        <p:nvPr/>
+      </p:nvGrpSpPr>
+      <p:grpSpPr>
+        <a:xfrm>
+          <a:off x="0" y="0"/>
+          <a:ext cx="0" cy="0"/>
+          <a:chOff x="0" y="0"/>
+          <a:chExt cx="0" cy="0"/>
+        </a:xfrm>
+      </p:grpSpPr>
+      <p:sp>
+        <p:nvSpPr>
+          <p:cNvPr id="2" name="Title 1">
+            <a:extLst>
+              <a:ext uri="{FF2B5EF4-FFF2-40B4-BE49-F238E27FC236}">
+                <a16:creationId xmlns:a16="http://schemas.microsoft.com/office/drawing/2014/main" id="{43E6C5D3-0CE9-998C-CB7B-6ABB44DEEA41}"/>
+              </a:ext>
+            </a:extLst>
+          </p:cNvPr>
+          <p:cNvSpPr>
+            <a:spLocks noGrp="1"/>
+          </p:cNvSpPr>
+          <p:nvPr>
+            <p:ph type="title"/>
+          </p:nvPr>
+        </p:nvSpPr>
+        <p:spPr/>
+        <p:txBody>
+          <a:bodyPr/>
+          <a:lstStyle/>
+          <a:p>
+            <a:r>
+              <a:rPr lang="en-RU" b="1" dirty="0"/>
+              <a:t>NIO Scatter/Gather</a:t>
+            </a:r>
+          </a:p>
+        </p:txBody>
+      </p:sp>
+      <p:sp>
+        <p:nvSpPr>
+          <p:cNvPr id="3" name="Content Placeholder 2">
+            <a:extLst>
+              <a:ext uri="{FF2B5EF4-FFF2-40B4-BE49-F238E27FC236}">
+                <a16:creationId xmlns:a16="http://schemas.microsoft.com/office/drawing/2014/main" id="{D0BAE70C-99F1-83EB-261E-945C36ACDC6E}"/>
+              </a:ext>
+            </a:extLst>
+          </p:cNvPr>
+          <p:cNvSpPr>
+            <a:spLocks noGrp="1"/>
+          </p:cNvSpPr>
+          <p:nvPr>
+            <p:ph idx="1"/>
+          </p:nvPr>
+        </p:nvSpPr>
+        <p:spPr/>
+        <p:txBody>
+          <a:bodyPr/>
+          <a:lstStyle/>
+          <a:p>
+            <a:r>
+              <a:rPr lang="en-RU" i="1" dirty="0"/>
+              <a:t>Scatter</a:t>
+            </a:r>
+            <a:r>
+              <a:rPr lang="en-RU" dirty="0"/>
+              <a:t> – </a:t>
+            </a:r>
+            <a:r>
+              <a:rPr lang="ru-RU" dirty="0"/>
+              <a:t>данные из одного канала записываются в разные буферы (Плохо работает с сообщениями с динамическим размером).</a:t>
+            </a:r>
+          </a:p>
+          <a:p>
+            <a:r>
+              <a:rPr lang="en-US" i="1" dirty="0"/>
+              <a:t>Gather</a:t>
+            </a:r>
+            <a:r>
+              <a:rPr lang="en-US" dirty="0"/>
+              <a:t> – </a:t>
+            </a:r>
+            <a:r>
+              <a:rPr lang="ru-RU" dirty="0"/>
+              <a:t>данные из разных буфером читаются в один канал (Хорошо работает с сообщениями с динамическим размером).</a:t>
+            </a:r>
+          </a:p>
+          <a:p>
+            <a:pPr marL="0" indent="0">
+              <a:buNone/>
+            </a:pPr>
+            <a:r>
+              <a:rPr lang="ru-RU" dirty="0"/>
+              <a:t>Пример</a:t>
+            </a:r>
+            <a:r>
+              <a:rPr lang="en-US" dirty="0"/>
+              <a:t>:</a:t>
+            </a:r>
+          </a:p>
+          <a:p>
+            <a:pPr marL="0" indent="0">
+              <a:buNone/>
+            </a:pPr>
+            <a:r>
+              <a:rPr lang="en-US" dirty="0"/>
+              <a:t>	</a:t>
+            </a:r>
+            <a:endParaRPr lang="ru-RU" dirty="0"/>
+          </a:p>
+          <a:p>
+            <a:endParaRPr lang="en-RU" dirty="0"/>
+          </a:p>
+        </p:txBody>
+      </p:sp>
+      <p:pic>
+        <p:nvPicPr>
+          <p:cNvPr id="5" name="Picture 4">
+            <a:extLst>
+              <a:ext uri="{FF2B5EF4-FFF2-40B4-BE49-F238E27FC236}">
+                <a16:creationId xmlns:a16="http://schemas.microsoft.com/office/drawing/2014/main" id="{506798D0-903B-859A-5469-798B86E6748C}"/>
+              </a:ext>
+            </a:extLst>
+          </p:cNvPr>
+          <p:cNvPicPr>
+            <a:picLocks noChangeAspect="1"/>
+          </p:cNvPicPr>
+          <p:nvPr/>
+        </p:nvPicPr>
+        <p:blipFill>
+          <a:blip r:embed="rId2"/>
+          <a:stretch>
+            <a:fillRect/>
+          </a:stretch>
+        </p:blipFill>
+        <p:spPr>
+          <a:xfrm>
+            <a:off x="3118701" y="4539189"/>
+            <a:ext cx="4737100" cy="1397000"/>
+          </a:xfrm>
+          <a:prstGeom prst="rect">
+            <a:avLst/>
+          </a:prstGeom>
+        </p:spPr>
+      </p:pic>
+    </p:spTree>
+    <p:extLst>
+      <p:ext uri="{BB962C8B-B14F-4D97-AF65-F5344CB8AC3E}">
+        <p14:creationId xmlns:p14="http://schemas.microsoft.com/office/powerpoint/2010/main" val="1676446595"/>
       </p:ext>
     </p:extLst>
   </p:cSld>
@@ -8561,10 +9904,10 @@
           <a:lstStyle/>
           <a:p>
             <a:r>
-              <a:rPr lang="en-US" i="1" dirty="0"/>
+              <a:rPr lang="en-US" b="1" dirty="0"/>
               <a:t>I/O Stream</a:t>
             </a:r>
-            <a:endParaRPr lang="ru-RU" dirty="0"/>
+            <a:endParaRPr lang="ru-RU" b="1" dirty="0"/>
           </a:p>
         </p:txBody>
       </p:sp>
@@ -8719,6 +10062,517 @@
     <p:extLst>
       <p:ext uri="{BB962C8B-B14F-4D97-AF65-F5344CB8AC3E}">
         <p14:creationId xmlns:p14="http://schemas.microsoft.com/office/powerpoint/2010/main" val="1733234557"/>
+      </p:ext>
+    </p:extLst>
+  </p:cSld>
+  <p:clrMapOvr>
+    <a:masterClrMapping/>
+  </p:clrMapOvr>
+</p:sld>
+</file>
+
+<file path=ppt/slides/slide20.xml><?xml version="1.0" encoding="utf-8"?>
+<p:sld xmlns:a="http://schemas.openxmlformats.org/drawingml/2006/main" xmlns:r="http://schemas.openxmlformats.org/officeDocument/2006/relationships" xmlns:p="http://schemas.openxmlformats.org/presentationml/2006/main">
+  <p:cSld>
+    <p:spTree>
+      <p:nvGrpSpPr>
+        <p:cNvPr id="1" name=""/>
+        <p:cNvGrpSpPr/>
+        <p:nvPr/>
+      </p:nvGrpSpPr>
+      <p:grpSpPr>
+        <a:xfrm>
+          <a:off x="0" y="0"/>
+          <a:ext cx="0" cy="0"/>
+          <a:chOff x="0" y="0"/>
+          <a:chExt cx="0" cy="0"/>
+        </a:xfrm>
+      </p:grpSpPr>
+      <p:sp>
+        <p:nvSpPr>
+          <p:cNvPr id="2" name="Title 1">
+            <a:extLst>
+              <a:ext uri="{FF2B5EF4-FFF2-40B4-BE49-F238E27FC236}">
+                <a16:creationId xmlns:a16="http://schemas.microsoft.com/office/drawing/2014/main" id="{43E6C5D3-0CE9-998C-CB7B-6ABB44DEEA41}"/>
+              </a:ext>
+            </a:extLst>
+          </p:cNvPr>
+          <p:cNvSpPr>
+            <a:spLocks noGrp="1"/>
+          </p:cNvSpPr>
+          <p:nvPr>
+            <p:ph type="title"/>
+          </p:nvPr>
+        </p:nvSpPr>
+        <p:spPr/>
+        <p:txBody>
+          <a:bodyPr/>
+          <a:lstStyle/>
+          <a:p>
+            <a:r>
+              <a:rPr lang="en-RU" b="1" dirty="0"/>
+              <a:t>NIO Selector</a:t>
+            </a:r>
+          </a:p>
+        </p:txBody>
+      </p:sp>
+      <p:sp>
+        <p:nvSpPr>
+          <p:cNvPr id="3" name="Content Placeholder 2">
+            <a:extLst>
+              <a:ext uri="{FF2B5EF4-FFF2-40B4-BE49-F238E27FC236}">
+                <a16:creationId xmlns:a16="http://schemas.microsoft.com/office/drawing/2014/main" id="{D0BAE70C-99F1-83EB-261E-945C36ACDC6E}"/>
+              </a:ext>
+            </a:extLst>
+          </p:cNvPr>
+          <p:cNvSpPr>
+            <a:spLocks noGrp="1"/>
+          </p:cNvSpPr>
+          <p:nvPr>
+            <p:ph idx="1"/>
+          </p:nvPr>
+        </p:nvSpPr>
+        <p:spPr/>
+        <p:txBody>
+          <a:bodyPr>
+            <a:normAutofit fontScale="77500" lnSpcReduction="20000"/>
+          </a:bodyPr>
+          <a:lstStyle/>
+          <a:p>
+            <a:r>
+              <a:rPr lang="en-US" i="1" dirty="0"/>
+              <a:t>Selector</a:t>
+            </a:r>
+            <a:r>
+              <a:rPr lang="ru-RU" i="1" dirty="0"/>
+              <a:t> </a:t>
+            </a:r>
+            <a:r>
+              <a:rPr lang="ru-RU" dirty="0"/>
+              <a:t>позволяет работать с несколькими каналами в одном потоке.</a:t>
+            </a:r>
+          </a:p>
+          <a:p>
+            <a:r>
+              <a:rPr lang="en-US" i="1" dirty="0"/>
+              <a:t>open() </a:t>
+            </a:r>
+            <a:r>
+              <a:rPr lang="en-US" dirty="0"/>
+              <a:t>– </a:t>
+            </a:r>
+            <a:r>
+              <a:rPr lang="ru-RU" dirty="0"/>
+              <a:t>создание экземпляра селектора</a:t>
+            </a:r>
+            <a:r>
+              <a:rPr lang="en-US" i="1" dirty="0"/>
+              <a:t>.</a:t>
+            </a:r>
+          </a:p>
+          <a:p>
+            <a:r>
+              <a:rPr lang="en-RU" i="1" dirty="0"/>
+              <a:t>register() – </a:t>
+            </a:r>
+            <a:r>
+              <a:rPr lang="ru-RU" dirty="0"/>
+              <a:t>регистрация каналов в селекторе </a:t>
+            </a:r>
+          </a:p>
+          <a:p>
+            <a:pPr lvl="1"/>
+            <a:r>
+              <a:rPr lang="ru-RU" dirty="0"/>
+              <a:t>Канал должен быть неблокирующим.</a:t>
+            </a:r>
+          </a:p>
+          <a:p>
+            <a:pPr lvl="1"/>
+            <a:r>
+              <a:rPr lang="ru-RU" dirty="0"/>
+              <a:t>Эвент, на которое канал должен реагировать </a:t>
+            </a:r>
+            <a:r>
+              <a:rPr lang="en-US" dirty="0"/>
+              <a:t>[</a:t>
+            </a:r>
+            <a:r>
+              <a:rPr lang="ru-RU" dirty="0"/>
+              <a:t>Несколько эвентов проставляются через ИЛИ (</a:t>
+            </a:r>
+            <a:r>
+              <a:rPr lang="en-US" dirty="0"/>
+              <a:t>|</a:t>
+            </a:r>
+            <a:r>
+              <a:rPr lang="ru-RU" dirty="0"/>
+              <a:t>)</a:t>
+            </a:r>
+            <a:r>
+              <a:rPr lang="en-US" dirty="0"/>
+              <a:t>]</a:t>
+            </a:r>
+            <a:r>
+              <a:rPr lang="ru-RU" dirty="0"/>
+              <a:t>.</a:t>
+            </a:r>
+            <a:endParaRPr lang="en-US" dirty="0"/>
+          </a:p>
+          <a:p>
+            <a:r>
+              <a:rPr lang="en-GB" dirty="0"/>
+              <a:t>select() blocks until at least one channel is ready for the events you registered for.</a:t>
+            </a:r>
+          </a:p>
+          <a:p>
+            <a:r>
+              <a:rPr lang="en-GB" dirty="0"/>
+              <a:t>select(long timeout) does the same as select() except it blocks for a maximum of timeout milliseconds (the parameter).</a:t>
+            </a:r>
+          </a:p>
+          <a:p>
+            <a:r>
+              <a:rPr lang="en-GB" dirty="0" err="1"/>
+              <a:t>selectNow</a:t>
+            </a:r>
+            <a:r>
+              <a:rPr lang="en-GB" dirty="0"/>
+              <a:t>() doesn't block at all. It returns immediately with whatever channels are ready</a:t>
+            </a:r>
+          </a:p>
+          <a:p>
+            <a:r>
+              <a:rPr lang="en-US" dirty="0"/>
+              <a:t>select </a:t>
+            </a:r>
+            <a:r>
+              <a:rPr lang="ru-RU" dirty="0"/>
+              <a:t>отображает готовность новых каналов с последнего вызова </a:t>
+            </a:r>
+            <a:r>
+              <a:rPr lang="en-US" dirty="0"/>
+              <a:t>select</a:t>
+            </a:r>
+            <a:r>
+              <a:rPr lang="ru-RU" dirty="0"/>
+              <a:t>.</a:t>
+            </a:r>
+          </a:p>
+        </p:txBody>
+      </p:sp>
+    </p:spTree>
+    <p:extLst>
+      <p:ext uri="{BB962C8B-B14F-4D97-AF65-F5344CB8AC3E}">
+        <p14:creationId xmlns:p14="http://schemas.microsoft.com/office/powerpoint/2010/main" val="797228521"/>
+      </p:ext>
+    </p:extLst>
+  </p:cSld>
+  <p:clrMapOvr>
+    <a:masterClrMapping/>
+  </p:clrMapOvr>
+</p:sld>
+</file>
+
+<file path=ppt/slides/slide21.xml><?xml version="1.0" encoding="utf-8"?>
+<p:sld xmlns:a="http://schemas.openxmlformats.org/drawingml/2006/main" xmlns:r="http://schemas.openxmlformats.org/officeDocument/2006/relationships" xmlns:p="http://schemas.openxmlformats.org/presentationml/2006/main">
+  <p:cSld>
+    <p:spTree>
+      <p:nvGrpSpPr>
+        <p:cNvPr id="1" name=""/>
+        <p:cNvGrpSpPr/>
+        <p:nvPr/>
+      </p:nvGrpSpPr>
+      <p:grpSpPr>
+        <a:xfrm>
+          <a:off x="0" y="0"/>
+          <a:ext cx="0" cy="0"/>
+          <a:chOff x="0" y="0"/>
+          <a:chExt cx="0" cy="0"/>
+        </a:xfrm>
+      </p:grpSpPr>
+      <p:sp>
+        <p:nvSpPr>
+          <p:cNvPr id="2" name="Title 1">
+            <a:extLst>
+              <a:ext uri="{FF2B5EF4-FFF2-40B4-BE49-F238E27FC236}">
+                <a16:creationId xmlns:a16="http://schemas.microsoft.com/office/drawing/2014/main" id="{43E6C5D3-0CE9-998C-CB7B-6ABB44DEEA41}"/>
+              </a:ext>
+            </a:extLst>
+          </p:cNvPr>
+          <p:cNvSpPr>
+            <a:spLocks noGrp="1"/>
+          </p:cNvSpPr>
+          <p:nvPr>
+            <p:ph type="title"/>
+          </p:nvPr>
+        </p:nvSpPr>
+        <p:spPr/>
+        <p:txBody>
+          <a:bodyPr/>
+          <a:lstStyle/>
+          <a:p>
+            <a:r>
+              <a:rPr lang="en-RU" b="1" dirty="0"/>
+              <a:t>NIO SelectionKey</a:t>
+            </a:r>
+          </a:p>
+        </p:txBody>
+      </p:sp>
+      <p:sp>
+        <p:nvSpPr>
+          <p:cNvPr id="3" name="Content Placeholder 2">
+            <a:extLst>
+              <a:ext uri="{FF2B5EF4-FFF2-40B4-BE49-F238E27FC236}">
+                <a16:creationId xmlns:a16="http://schemas.microsoft.com/office/drawing/2014/main" id="{D0BAE70C-99F1-83EB-261E-945C36ACDC6E}"/>
+              </a:ext>
+            </a:extLst>
+          </p:cNvPr>
+          <p:cNvSpPr>
+            <a:spLocks noGrp="1"/>
+          </p:cNvSpPr>
+          <p:nvPr>
+            <p:ph idx="1"/>
+          </p:nvPr>
+        </p:nvSpPr>
+        <p:spPr/>
+        <p:txBody>
+          <a:bodyPr>
+            <a:normAutofit/>
+          </a:bodyPr>
+          <a:lstStyle/>
+          <a:p>
+            <a:r>
+              <a:rPr lang="ru-RU" dirty="0"/>
+              <a:t>Здесь содержится список эвентов.</a:t>
+            </a:r>
+          </a:p>
+          <a:p>
+            <a:r>
+              <a:rPr lang="en-US" i="1" dirty="0"/>
+              <a:t>is*</a:t>
+            </a:r>
+            <a:r>
+              <a:rPr lang="ru-RU" i="1" dirty="0"/>
+              <a:t>эвент</a:t>
+            </a:r>
+            <a:r>
+              <a:rPr lang="en-US" i="1" dirty="0"/>
+              <a:t>*</a:t>
+            </a:r>
+            <a:r>
+              <a:rPr lang="ru-RU" i="1" dirty="0"/>
+              <a:t>() – </a:t>
+            </a:r>
+            <a:r>
+              <a:rPr lang="ru-RU" dirty="0"/>
+              <a:t>какой эвент ожидается.</a:t>
+            </a:r>
+          </a:p>
+          <a:p>
+            <a:r>
+              <a:rPr lang="en-GB" i="1" dirty="0"/>
+              <a:t>channel</a:t>
+            </a:r>
+            <a:r>
+              <a:rPr lang="ru-RU" i="1" dirty="0"/>
+              <a:t>()</a:t>
+            </a:r>
+          </a:p>
+          <a:p>
+            <a:r>
+              <a:rPr lang="en-GB" i="1" dirty="0"/>
+              <a:t>selector</a:t>
+            </a:r>
+            <a:r>
+              <a:rPr lang="ru-RU" i="1" dirty="0"/>
+              <a:t>()</a:t>
+            </a:r>
+          </a:p>
+          <a:p>
+            <a:r>
+              <a:rPr lang="en-GB" i="1" dirty="0"/>
+              <a:t>attach</a:t>
+            </a:r>
+            <a:r>
+              <a:rPr lang="ru-RU" i="1" dirty="0"/>
+              <a:t>() – </a:t>
+            </a:r>
+            <a:r>
+              <a:rPr lang="ru-RU" dirty="0"/>
+              <a:t>присоединяет объект к </a:t>
+            </a:r>
+            <a:r>
+              <a:rPr lang="en-RU" i="1" dirty="0"/>
+              <a:t>SelectionKey</a:t>
+            </a:r>
+            <a:r>
+              <a:rPr lang="ru-RU" i="1" dirty="0"/>
+              <a:t> </a:t>
+            </a:r>
+            <a:r>
+              <a:rPr lang="ru-RU" dirty="0"/>
+              <a:t>(Можно привязать </a:t>
+            </a:r>
+            <a:r>
+              <a:rPr lang="en-US" i="1" dirty="0"/>
+              <a:t>Buffer </a:t>
+            </a:r>
+            <a:r>
+              <a:rPr lang="ru-RU" dirty="0"/>
+              <a:t>или агрегирующий класс)</a:t>
+            </a:r>
+            <a:r>
+              <a:rPr lang="en-US" dirty="0"/>
+              <a:t>.</a:t>
+            </a:r>
+          </a:p>
+          <a:p>
+            <a:endParaRPr lang="ru-RU" dirty="0"/>
+          </a:p>
+        </p:txBody>
+      </p:sp>
+    </p:spTree>
+    <p:extLst>
+      <p:ext uri="{BB962C8B-B14F-4D97-AF65-F5344CB8AC3E}">
+        <p14:creationId xmlns:p14="http://schemas.microsoft.com/office/powerpoint/2010/main" val="1043397208"/>
+      </p:ext>
+    </p:extLst>
+  </p:cSld>
+  <p:clrMapOvr>
+    <a:masterClrMapping/>
+  </p:clrMapOvr>
+</p:sld>
+</file>
+
+<file path=ppt/slides/slide22.xml><?xml version="1.0" encoding="utf-8"?>
+<p:sld xmlns:a="http://schemas.openxmlformats.org/drawingml/2006/main" xmlns:r="http://schemas.openxmlformats.org/officeDocument/2006/relationships" xmlns:p="http://schemas.openxmlformats.org/presentationml/2006/main">
+  <p:cSld>
+    <p:spTree>
+      <p:nvGrpSpPr>
+        <p:cNvPr id="1" name=""/>
+        <p:cNvGrpSpPr/>
+        <p:nvPr/>
+      </p:nvGrpSpPr>
+      <p:grpSpPr>
+        <a:xfrm>
+          <a:off x="0" y="0"/>
+          <a:ext cx="0" cy="0"/>
+          <a:chOff x="0" y="0"/>
+          <a:chExt cx="0" cy="0"/>
+        </a:xfrm>
+      </p:grpSpPr>
+      <p:sp>
+        <p:nvSpPr>
+          <p:cNvPr id="2" name="Title 1">
+            <a:extLst>
+              <a:ext uri="{FF2B5EF4-FFF2-40B4-BE49-F238E27FC236}">
+                <a16:creationId xmlns:a16="http://schemas.microsoft.com/office/drawing/2014/main" id="{8B0DA60C-2C2D-844A-B24D-69FAD537F71C}"/>
+              </a:ext>
+            </a:extLst>
+          </p:cNvPr>
+          <p:cNvSpPr>
+            <a:spLocks noGrp="1"/>
+          </p:cNvSpPr>
+          <p:nvPr>
+            <p:ph type="title"/>
+          </p:nvPr>
+        </p:nvSpPr>
+        <p:spPr/>
+        <p:txBody>
+          <a:bodyPr/>
+          <a:lstStyle/>
+          <a:p>
+            <a:r>
+              <a:rPr lang="en-US" b="1" dirty="0" err="1"/>
+              <a:t>OpenOptions</a:t>
+            </a:r>
+            <a:endParaRPr lang="ru-RU" b="1" dirty="0"/>
+          </a:p>
+        </p:txBody>
+      </p:sp>
+      <p:sp>
+        <p:nvSpPr>
+          <p:cNvPr id="3" name="Content Placeholder 2">
+            <a:extLst>
+              <a:ext uri="{FF2B5EF4-FFF2-40B4-BE49-F238E27FC236}">
+                <a16:creationId xmlns:a16="http://schemas.microsoft.com/office/drawing/2014/main" id="{A2D6EA14-6494-3D49-B2B1-B1618FA0B0AB}"/>
+              </a:ext>
+            </a:extLst>
+          </p:cNvPr>
+          <p:cNvSpPr>
+            <a:spLocks noGrp="1"/>
+          </p:cNvSpPr>
+          <p:nvPr>
+            <p:ph idx="1"/>
+          </p:nvPr>
+        </p:nvSpPr>
+        <p:spPr/>
+        <p:txBody>
+          <a:bodyPr>
+            <a:normAutofit fontScale="62500" lnSpcReduction="20000"/>
+          </a:bodyPr>
+          <a:lstStyle/>
+          <a:p>
+            <a:r>
+              <a:rPr lang="en-US" dirty="0"/>
+              <a:t>WRITE – Opens the file for write access.</a:t>
+            </a:r>
+          </a:p>
+          <a:p>
+            <a:r>
+              <a:rPr lang="en-US" dirty="0"/>
+              <a:t>APPEND – Appends the new data to the end of the file. This option is used with the WRITE or CREATE options.</a:t>
+            </a:r>
+          </a:p>
+          <a:p>
+            <a:r>
+              <a:rPr lang="en-US" dirty="0"/>
+              <a:t>TRUNCATE_EXISTING – Truncates the file to zero bytes. This option is used with the WRITE option.</a:t>
+            </a:r>
+          </a:p>
+          <a:p>
+            <a:r>
+              <a:rPr lang="en-US" dirty="0"/>
+              <a:t>CREATE_NEW – Creates a new file and throws an exception if the file already exists.</a:t>
+            </a:r>
+          </a:p>
+          <a:p>
+            <a:r>
+              <a:rPr lang="en-US" dirty="0"/>
+              <a:t>CREATE – Opens the file if it exists or creates a new file if it does not.</a:t>
+            </a:r>
+          </a:p>
+          <a:p>
+            <a:r>
+              <a:rPr lang="en-US" dirty="0"/>
+              <a:t>DELETE_ON_CLOSE – Deletes the file when the stream is closed. This option is useful for temporary files.</a:t>
+            </a:r>
+          </a:p>
+          <a:p>
+            <a:r>
+              <a:rPr lang="en-US" dirty="0"/>
+              <a:t>SPARSE – Hints that a newly created file will be sparse. This advanced option is honored on some file systems, such as NTFS, where large files with data "gaps" can be stored in a more efficient manner where those empty gaps do not consume disk space.</a:t>
+            </a:r>
+          </a:p>
+          <a:p>
+            <a:r>
+              <a:rPr lang="en-US" dirty="0"/>
+              <a:t>SYNC – Keeps the file (both content and metadata) synchronized with the underlying storage device.</a:t>
+            </a:r>
+          </a:p>
+          <a:p>
+            <a:r>
+              <a:rPr lang="en-US" dirty="0"/>
+              <a:t>DSYNC – Keeps the file content synchronized with the underlying storage device.</a:t>
+            </a:r>
+          </a:p>
+        </p:txBody>
+      </p:sp>
+    </p:spTree>
+    <p:extLst>
+      <p:ext uri="{BB962C8B-B14F-4D97-AF65-F5344CB8AC3E}">
+        <p14:creationId xmlns:p14="http://schemas.microsoft.com/office/powerpoint/2010/main" val="53030545"/>
       </p:ext>
     </p:extLst>
   </p:cSld>
@@ -8767,12 +10621,8 @@
           <a:lstStyle/>
           <a:p>
             <a:r>
-              <a:rPr lang="ru-RU" i="1" dirty="0" err="1"/>
-              <a:t>Стримы</a:t>
-            </a:r>
-            <a:r>
-              <a:rPr lang="ru-RU" i="1" dirty="0"/>
-              <a:t> байтов</a:t>
+              <a:rPr lang="ru-RU" b="1" dirty="0"/>
+              <a:t>Стримы байтов</a:t>
             </a:r>
           </a:p>
         </p:txBody>
@@ -8968,12 +10818,8 @@
           <a:lstStyle/>
           <a:p>
             <a:r>
-              <a:rPr lang="ru-RU" i="1" dirty="0" err="1"/>
-              <a:t>Стримы</a:t>
-            </a:r>
-            <a:r>
-              <a:rPr lang="ru-RU" i="1" dirty="0"/>
-              <a:t> символов </a:t>
+              <a:rPr lang="ru-RU" b="1" dirty="0"/>
+              <a:t>Стримы символов </a:t>
             </a:r>
           </a:p>
         </p:txBody>
@@ -9154,14 +11000,14 @@
           <a:lstStyle/>
           <a:p>
             <a:r>
-              <a:rPr lang="ru-RU" i="1" dirty="0"/>
+              <a:rPr lang="ru-RU" b="1" dirty="0"/>
               <a:t>Буферизованные </a:t>
             </a:r>
             <a:r>
-              <a:rPr lang="ru-RU" i="1" dirty="0" err="1"/>
+              <a:rPr lang="ru-RU" b="1" dirty="0" err="1"/>
               <a:t>стримы</a:t>
             </a:r>
-            <a:endParaRPr lang="ru-RU" i="1" dirty="0"/>
+            <a:endParaRPr lang="ru-RU" b="1" dirty="0"/>
           </a:p>
         </p:txBody>
       </p:sp>
@@ -9368,18 +11214,18 @@
           <a:lstStyle/>
           <a:p>
             <a:r>
-              <a:rPr lang="ru-RU" i="1" dirty="0" err="1"/>
+              <a:rPr lang="ru-RU" b="1" dirty="0" err="1"/>
               <a:t>Строко</a:t>
             </a:r>
             <a:r>
-              <a:rPr lang="ru-RU" i="1" dirty="0"/>
+              <a:rPr lang="ru-RU" b="1" dirty="0"/>
               <a:t>-ориентированное </a:t>
             </a:r>
             <a:r>
-              <a:rPr lang="en-US" i="1" dirty="0"/>
+              <a:rPr lang="en-US" b="1" dirty="0"/>
               <a:t>I/O</a:t>
             </a:r>
-            <a:endParaRPr lang="ru-RU" i="1" dirty="0"/>
+            <a:endParaRPr lang="ru-RU" b="1" dirty="0"/>
           </a:p>
         </p:txBody>
       </p:sp>
@@ -9505,26 +11351,26 @@
           <a:lstStyle/>
           <a:p>
             <a:r>
-              <a:rPr lang="en-US" i="1" dirty="0"/>
+              <a:rPr lang="en-US" b="1" dirty="0"/>
               <a:t>Scanner </a:t>
             </a:r>
             <a:r>
-              <a:rPr lang="ru-RU" i="1" dirty="0"/>
+              <a:rPr lang="ru-RU" b="1" dirty="0"/>
               <a:t>и </a:t>
             </a:r>
             <a:r>
-              <a:rPr lang="en-US" i="1" dirty="0" err="1"/>
+              <a:rPr lang="en-US" b="1" dirty="0" err="1"/>
               <a:t>PrintWriter</a:t>
             </a:r>
             <a:r>
-              <a:rPr lang="en-US" i="1" dirty="0"/>
+              <a:rPr lang="en-US" b="1" dirty="0"/>
               <a:t>/</a:t>
             </a:r>
             <a:r>
-              <a:rPr lang="en-US" i="1" dirty="0" err="1"/>
+              <a:rPr lang="en-US" b="1" dirty="0" err="1"/>
               <a:t>PrintStream</a:t>
             </a:r>
-            <a:endParaRPr lang="ru-RU" i="1" dirty="0"/>
+            <a:endParaRPr lang="ru-RU" b="1" dirty="0"/>
           </a:p>
         </p:txBody>
       </p:sp>
@@ -9824,10 +11670,10 @@
           <a:lstStyle/>
           <a:p>
             <a:r>
-              <a:rPr lang="en-US" dirty="0"/>
+              <a:rPr lang="en-US" b="1" dirty="0"/>
               <a:t>Console</a:t>
             </a:r>
-            <a:endParaRPr lang="ru-RU" dirty="0"/>
+            <a:endParaRPr lang="ru-RU" b="1" dirty="0"/>
           </a:p>
         </p:txBody>
       </p:sp>
@@ -9998,10 +11844,10 @@
           <a:lstStyle/>
           <a:p>
             <a:r>
-              <a:rPr lang="en-US" i="1" dirty="0"/>
+              <a:rPr lang="en-US" b="1" dirty="0"/>
               <a:t>Path</a:t>
             </a:r>
-            <a:endParaRPr lang="ru-RU" i="1" dirty="0"/>
+            <a:endParaRPr lang="ru-RU" b="1" dirty="0"/>
           </a:p>
         </p:txBody>
       </p:sp>

</xml_diff>